<commit_message>
Made final MidPresentation changes
</commit_message>
<xml_diff>
--- a/docs/MidPresentation.pptx
+++ b/docs/MidPresentation.pptx
@@ -108,6 +108,11 @@
       </a:defRPr>
     </a:lvl9pPr>
   </p:defaultTextStyle>
+  <p:extLst>
+    <p:ext uri="{EFAFB233-063F-42B5-8137-9DF3F51BA10A}">
+      <p15:sldGuideLst xmlns:p15="http://schemas.microsoft.com/office/powerpoint/2012/main"/>
+    </p:ext>
+  </p:extLst>
 </p:presentation>
 </file>
 
@@ -337,7 +342,7 @@
           <a:p>
             <a:fld id="{229BEAD9-BF38-40BE-9F41-7781F3B62859}" type="datetimeFigureOut">
               <a:rPr lang="el-GR" smtClean="0"/>
-              <a:t>9/4/2022</a:t>
+              <a:t>10/4/2022</a:t>
             </a:fld>
             <a:endParaRPr lang="el-GR" dirty="0"/>
           </a:p>
@@ -545,7 +550,7 @@
           <a:p>
             <a:fld id="{229BEAD9-BF38-40BE-9F41-7781F3B62859}" type="datetimeFigureOut">
               <a:rPr lang="el-GR" smtClean="0"/>
-              <a:t>9/4/2022</a:t>
+              <a:t>10/4/2022</a:t>
             </a:fld>
             <a:endParaRPr lang="el-GR" dirty="0"/>
           </a:p>
@@ -801,7 +806,7 @@
           <a:p>
             <a:fld id="{229BEAD9-BF38-40BE-9F41-7781F3B62859}" type="datetimeFigureOut">
               <a:rPr lang="el-GR" smtClean="0"/>
-              <a:t>9/4/2022</a:t>
+              <a:t>10/4/2022</a:t>
             </a:fld>
             <a:endParaRPr lang="el-GR" dirty="0"/>
           </a:p>
@@ -975,7 +980,7 @@
           <a:p>
             <a:fld id="{229BEAD9-BF38-40BE-9F41-7781F3B62859}" type="datetimeFigureOut">
               <a:rPr lang="el-GR" smtClean="0"/>
-              <a:t>9/4/2022</a:t>
+              <a:t>10/4/2022</a:t>
             </a:fld>
             <a:endParaRPr lang="el-GR" dirty="0"/>
           </a:p>
@@ -1318,7 +1323,7 @@
           <a:p>
             <a:fld id="{229BEAD9-BF38-40BE-9F41-7781F3B62859}" type="datetimeFigureOut">
               <a:rPr lang="el-GR" smtClean="0"/>
-              <a:t>9/4/2022</a:t>
+              <a:t>10/4/2022</a:t>
             </a:fld>
             <a:endParaRPr lang="el-GR" dirty="0"/>
           </a:p>
@@ -1593,7 +1598,7 @@
           <a:p>
             <a:fld id="{229BEAD9-BF38-40BE-9F41-7781F3B62859}" type="datetimeFigureOut">
               <a:rPr lang="el-GR" smtClean="0"/>
-              <a:t>9/4/2022</a:t>
+              <a:t>10/4/2022</a:t>
             </a:fld>
             <a:endParaRPr lang="el-GR" dirty="0"/>
           </a:p>
@@ -1972,7 +1977,7 @@
           <a:p>
             <a:fld id="{229BEAD9-BF38-40BE-9F41-7781F3B62859}" type="datetimeFigureOut">
               <a:rPr lang="el-GR" smtClean="0"/>
-              <a:t>9/4/2022</a:t>
+              <a:t>10/4/2022</a:t>
             </a:fld>
             <a:endParaRPr lang="el-GR" dirty="0"/>
           </a:p>
@@ -2090,7 +2095,7 @@
           <a:p>
             <a:fld id="{229BEAD9-BF38-40BE-9F41-7781F3B62859}" type="datetimeFigureOut">
               <a:rPr lang="el-GR" smtClean="0"/>
-              <a:t>9/4/2022</a:t>
+              <a:t>10/4/2022</a:t>
             </a:fld>
             <a:endParaRPr lang="el-GR" dirty="0"/>
           </a:p>
@@ -2261,7 +2266,7 @@
           <a:p>
             <a:fld id="{229BEAD9-BF38-40BE-9F41-7781F3B62859}" type="datetimeFigureOut">
               <a:rPr lang="el-GR" smtClean="0"/>
-              <a:t>9/4/2022</a:t>
+              <a:t>10/4/2022</a:t>
             </a:fld>
             <a:endParaRPr lang="el-GR" dirty="0"/>
           </a:p>
@@ -2615,7 +2620,7 @@
           <a:p>
             <a:fld id="{229BEAD9-BF38-40BE-9F41-7781F3B62859}" type="datetimeFigureOut">
               <a:rPr lang="el-GR" smtClean="0"/>
-              <a:t>9/4/2022</a:t>
+              <a:t>10/4/2022</a:t>
             </a:fld>
             <a:endParaRPr lang="el-GR" dirty="0"/>
           </a:p>
@@ -2997,7 +3002,7 @@
           <a:p>
             <a:fld id="{229BEAD9-BF38-40BE-9F41-7781F3B62859}" type="datetimeFigureOut">
               <a:rPr lang="el-GR" smtClean="0"/>
-              <a:t>9/4/2022</a:t>
+              <a:t>10/4/2022</a:t>
             </a:fld>
             <a:endParaRPr lang="el-GR" dirty="0"/>
           </a:p>
@@ -3284,7 +3289,7 @@
           <a:p>
             <a:fld id="{229BEAD9-BF38-40BE-9F41-7781F3B62859}" type="datetimeFigureOut">
               <a:rPr lang="el-GR" smtClean="0"/>
-              <a:t>9/4/2022</a:t>
+              <a:t>10/4/2022</a:t>
             </a:fld>
             <a:endParaRPr lang="el-GR" dirty="0"/>
           </a:p>
@@ -4496,6 +4501,42 @@
           </a:p>
         </p:txBody>
       </p:sp>
+      <p:pic>
+        <p:nvPicPr>
+          <p:cNvPr id="5" name="Εικόνα 4">
+            <a:extLst>
+              <a:ext uri="{FF2B5EF4-FFF2-40B4-BE49-F238E27FC236}">
+                <a16:creationId xmlns:a16="http://schemas.microsoft.com/office/drawing/2014/main" id="{F0068F9A-1FD7-40D1-AD13-447ED2DD3ED1}"/>
+              </a:ext>
+            </a:extLst>
+          </p:cNvPr>
+          <p:cNvPicPr>
+            <a:picLocks noChangeAspect="1"/>
+          </p:cNvPicPr>
+          <p:nvPr/>
+        </p:nvPicPr>
+        <p:blipFill>
+          <a:blip r:embed="rId2">
+            <a:extLst>
+              <a:ext uri="{28A0092B-C50C-407E-A947-70E740481C1C}">
+                <a14:useLocalDpi xmlns:a14="http://schemas.microsoft.com/office/drawing/2010/main" val="0"/>
+              </a:ext>
+            </a:extLst>
+          </a:blip>
+          <a:stretch>
+            <a:fillRect/>
+          </a:stretch>
+        </p:blipFill>
+        <p:spPr>
+          <a:xfrm>
+            <a:off x="3799484" y="1845734"/>
+            <a:ext cx="7356196" cy="4023360"/>
+          </a:xfrm>
+          <a:prstGeom prst="rect">
+            <a:avLst/>
+          </a:prstGeom>
+        </p:spPr>
+      </p:pic>
     </p:spTree>
     <p:extLst>
       <p:ext uri="{BB962C8B-B14F-4D97-AF65-F5344CB8AC3E}">

</xml_diff>